<commit_message>
initial commit on new-classes and metaclasses
</commit_message>
<xml_diff>
--- a/semaine5/CO12AL-W5-VIDEO08-SLIDE01.pptx
+++ b/semaine5/CO12AL-W5-VIDEO08-SLIDE01.pptx
@@ -7068,7 +7068,7 @@
         </p:nvSpPr>
         <p:spPr>
           <a:xfrm>
-            <a:off x="468198" y="3193518"/>
+            <a:off x="468198" y="2952129"/>
             <a:ext cx="2318847" cy="838775"/>
           </a:xfrm>
         </p:spPr>
@@ -7095,7 +7095,7 @@
         </p:nvSpPr>
         <p:spPr>
           <a:xfrm>
-            <a:off x="609600" y="2177855"/>
+            <a:off x="609600" y="1936466"/>
             <a:ext cx="2939753" cy="1015663"/>
           </a:xfrm>
           <a:prstGeom prst="rect">
@@ -7129,7 +7129,7 @@
         </p:nvSpPr>
         <p:spPr>
           <a:xfrm>
-            <a:off x="4060676" y="2177855"/>
+            <a:off x="4060676" y="1936466"/>
             <a:ext cx="3214643" cy="1015663"/>
           </a:xfrm>
           <a:prstGeom prst="rect">
@@ -7163,7 +7163,7 @@
         </p:nvSpPr>
         <p:spPr>
           <a:xfrm>
-            <a:off x="7786642" y="2177855"/>
+            <a:off x="7786642" y="1936466"/>
             <a:ext cx="3214643" cy="1015663"/>
           </a:xfrm>
           <a:prstGeom prst="rect">
@@ -7199,7 +7199,7 @@
         </p:nvSpPr>
         <p:spPr bwMode="auto">
           <a:xfrm>
-            <a:off x="4136088" y="3183683"/>
+            <a:off x="4136088" y="2942294"/>
             <a:ext cx="2778734" cy="838775"/>
           </a:xfrm>
           <a:prstGeom prst="rect">
@@ -7417,7 +7417,7 @@
         </p:nvSpPr>
         <p:spPr bwMode="auto">
           <a:xfrm>
-            <a:off x="7786642" y="3181106"/>
+            <a:off x="7786642" y="2939717"/>
             <a:ext cx="2606028" cy="838775"/>
           </a:xfrm>
           <a:prstGeom prst="rect">
@@ -7658,8 +7658,8 @@
         </p:nvSpPr>
         <p:spPr bwMode="auto">
           <a:xfrm>
-            <a:off x="23669" y="4715577"/>
-            <a:ext cx="9108569" cy="838775"/>
+            <a:off x="142939" y="4218620"/>
+            <a:ext cx="7490314" cy="838775"/>
           </a:xfrm>
           <a:prstGeom prst="rect">
             <a:avLst/>
@@ -11662,9 +11662,6 @@
               </a:rPr>
               <a:t>G</a:t>
             </a:r>
-            <a:endParaRPr lang="fr-FR" sz="7200" dirty="0">
-              <a:latin typeface="Calibri" panose="020F0502020204030204" pitchFamily="34" charset="0"/>
-            </a:endParaRPr>
           </a:p>
         </p:txBody>
       </p:sp>

</xml_diff>